<commit_message>
Many stations showing NAs in all repetitions
</commit_message>
<xml_diff>
--- a/figures/interpolation_concept.pptx
+++ b/figures/interpolation_concept.pptx
@@ -263,7 +263,7 @@
           <a:p>
             <a:fld id="{AFEDA113-42A8-4B4B-8FAE-0FFA23006852}" type="datetimeFigureOut">
               <a:rPr lang="de-DE" smtClean="0"/>
-              <a:t>26.05.21</a:t>
+              <a:t>27.05.21</a:t>
             </a:fld>
             <a:endParaRPr lang="de-DE"/>
           </a:p>
@@ -461,7 +461,7 @@
           <a:p>
             <a:fld id="{AFEDA113-42A8-4B4B-8FAE-0FFA23006852}" type="datetimeFigureOut">
               <a:rPr lang="de-DE" smtClean="0"/>
-              <a:t>26.05.21</a:t>
+              <a:t>27.05.21</a:t>
             </a:fld>
             <a:endParaRPr lang="de-DE"/>
           </a:p>
@@ -669,7 +669,7 @@
           <a:p>
             <a:fld id="{AFEDA113-42A8-4B4B-8FAE-0FFA23006852}" type="datetimeFigureOut">
               <a:rPr lang="de-DE" smtClean="0"/>
-              <a:t>26.05.21</a:t>
+              <a:t>27.05.21</a:t>
             </a:fld>
             <a:endParaRPr lang="de-DE"/>
           </a:p>
@@ -867,7 +867,7 @@
           <a:p>
             <a:fld id="{AFEDA113-42A8-4B4B-8FAE-0FFA23006852}" type="datetimeFigureOut">
               <a:rPr lang="de-DE" smtClean="0"/>
-              <a:t>26.05.21</a:t>
+              <a:t>27.05.21</a:t>
             </a:fld>
             <a:endParaRPr lang="de-DE"/>
           </a:p>
@@ -1142,7 +1142,7 @@
           <a:p>
             <a:fld id="{AFEDA113-42A8-4B4B-8FAE-0FFA23006852}" type="datetimeFigureOut">
               <a:rPr lang="de-DE" smtClean="0"/>
-              <a:t>26.05.21</a:t>
+              <a:t>27.05.21</a:t>
             </a:fld>
             <a:endParaRPr lang="de-DE"/>
           </a:p>
@@ -1407,7 +1407,7 @@
           <a:p>
             <a:fld id="{AFEDA113-42A8-4B4B-8FAE-0FFA23006852}" type="datetimeFigureOut">
               <a:rPr lang="de-DE" smtClean="0"/>
-              <a:t>26.05.21</a:t>
+              <a:t>27.05.21</a:t>
             </a:fld>
             <a:endParaRPr lang="de-DE"/>
           </a:p>
@@ -1819,7 +1819,7 @@
           <a:p>
             <a:fld id="{AFEDA113-42A8-4B4B-8FAE-0FFA23006852}" type="datetimeFigureOut">
               <a:rPr lang="de-DE" smtClean="0"/>
-              <a:t>26.05.21</a:t>
+              <a:t>27.05.21</a:t>
             </a:fld>
             <a:endParaRPr lang="de-DE"/>
           </a:p>
@@ -1960,7 +1960,7 @@
           <a:p>
             <a:fld id="{AFEDA113-42A8-4B4B-8FAE-0FFA23006852}" type="datetimeFigureOut">
               <a:rPr lang="de-DE" smtClean="0"/>
-              <a:t>26.05.21</a:t>
+              <a:t>27.05.21</a:t>
             </a:fld>
             <a:endParaRPr lang="de-DE"/>
           </a:p>
@@ -2073,7 +2073,7 @@
           <a:p>
             <a:fld id="{AFEDA113-42A8-4B4B-8FAE-0FFA23006852}" type="datetimeFigureOut">
               <a:rPr lang="de-DE" smtClean="0"/>
-              <a:t>26.05.21</a:t>
+              <a:t>27.05.21</a:t>
             </a:fld>
             <a:endParaRPr lang="de-DE"/>
           </a:p>
@@ -2384,7 +2384,7 @@
           <a:p>
             <a:fld id="{AFEDA113-42A8-4B4B-8FAE-0FFA23006852}" type="datetimeFigureOut">
               <a:rPr lang="de-DE" smtClean="0"/>
-              <a:t>26.05.21</a:t>
+              <a:t>27.05.21</a:t>
             </a:fld>
             <a:endParaRPr lang="de-DE"/>
           </a:p>
@@ -2672,7 +2672,7 @@
           <a:p>
             <a:fld id="{AFEDA113-42A8-4B4B-8FAE-0FFA23006852}" type="datetimeFigureOut">
               <a:rPr lang="de-DE" smtClean="0"/>
-              <a:t>26.05.21</a:t>
+              <a:t>27.05.21</a:t>
             </a:fld>
             <a:endParaRPr lang="de-DE"/>
           </a:p>
@@ -2913,7 +2913,7 @@
           <a:p>
             <a:fld id="{AFEDA113-42A8-4B4B-8FAE-0FFA23006852}" type="datetimeFigureOut">
               <a:rPr lang="de-DE" smtClean="0"/>
-              <a:t>26.05.21</a:t>
+              <a:t>27.05.21</a:t>
             </a:fld>
             <a:endParaRPr lang="de-DE"/>
           </a:p>
@@ -4837,7 +4837,7 @@
         </p:nvGrpSpPr>
         <p:grpSpPr>
           <a:xfrm>
-            <a:off x="8992587" y="1454886"/>
+            <a:off x="9104235" y="1473694"/>
             <a:ext cx="2875562" cy="4244787"/>
             <a:chOff x="8166686" y="2226858"/>
             <a:chExt cx="2252310" cy="3324768"/>
@@ -4928,7 +4928,7 @@
           <p:spPr>
             <a:xfrm>
               <a:off x="9809043" y="3891652"/>
-              <a:ext cx="609953" cy="369332"/>
+              <a:ext cx="609953" cy="337496"/>
             </a:xfrm>
             <a:prstGeom prst="rect">
               <a:avLst/>
@@ -4943,7 +4943,7 @@
             <a:p>
               <a:pPr algn="ctr"/>
               <a:r>
-                <a:rPr lang="en-DE" sz="900" dirty="0">
+                <a:rPr lang="en-DE" sz="1100" dirty="0">
                   <a:latin typeface="+mj-lt"/>
                 </a:rPr>
                 <a:t>Chill Portions</a:t>
@@ -4961,13 +4961,15 @@
               </a:ext>
             </a:extLst>
           </p:cNvPr>
-          <p:cNvSpPr/>
+          <p:cNvSpPr>
+            <a:spLocks noChangeAspect="1"/>
+          </p:cNvSpPr>
           <p:nvPr/>
         </p:nvSpPr>
         <p:spPr>
           <a:xfrm>
-            <a:off x="9039714" y="1042796"/>
-            <a:ext cx="2848953" cy="4612365"/>
+            <a:off x="9154645" y="1042796"/>
+            <a:ext cx="2852013" cy="4612365"/>
           </a:xfrm>
           <a:prstGeom prst="rect">
             <a:avLst/>
@@ -5018,8 +5020,8 @@
         </p:nvSpPr>
         <p:spPr>
           <a:xfrm>
-            <a:off x="9473128" y="885166"/>
-            <a:ext cx="2208228" cy="804148"/>
+            <a:off x="9449752" y="870505"/>
+            <a:ext cx="2487453" cy="804148"/>
           </a:xfrm>
           <a:prstGeom prst="rect">
             <a:avLst/>
@@ -5051,7 +5053,7 @@
           <a:p>
             <a:pPr algn="ctr"/>
             <a:r>
-              <a:rPr lang="en-GB" dirty="0">
+              <a:rPr lang="en-GB" sz="1900" dirty="0">
                 <a:solidFill>
                   <a:schemeClr val="tx1"/>
                 </a:solidFill>
@@ -5268,7 +5270,7 @@
           <a:p>
             <a:pPr algn="ctr"/>
             <a:r>
-              <a:rPr lang="en-GB" dirty="0">
+              <a:rPr lang="en-GB" sz="1900" dirty="0">
                 <a:solidFill>
                   <a:schemeClr val="tx1"/>
                 </a:solidFill>
@@ -5292,7 +5294,7 @@
         </p:nvSpPr>
         <p:spPr>
           <a:xfrm>
-            <a:off x="6107135" y="5699673"/>
+            <a:off x="6130765" y="5699673"/>
             <a:ext cx="2659807" cy="804148"/>
           </a:xfrm>
           <a:prstGeom prst="rect">
@@ -5329,7 +5331,7 @@
           <a:p>
             <a:pPr algn="ctr"/>
             <a:r>
-              <a:rPr lang="en-GB" dirty="0">
+              <a:rPr lang="en-GB" sz="1900" dirty="0">
                 <a:solidFill>
                   <a:schemeClr val="tx1"/>
                 </a:solidFill>
@@ -5390,7 +5392,7 @@
           <a:p>
             <a:pPr algn="ctr"/>
             <a:r>
-              <a:rPr lang="en-GB" dirty="0">
+              <a:rPr lang="en-GB" sz="1900" dirty="0">
                 <a:solidFill>
                   <a:schemeClr val="tx1"/>
                 </a:solidFill>
@@ -5414,7 +5416,7 @@
         </p:nvSpPr>
         <p:spPr>
           <a:xfrm>
-            <a:off x="6107135" y="2288941"/>
+            <a:off x="6132934" y="2288941"/>
             <a:ext cx="2655469" cy="804148"/>
           </a:xfrm>
           <a:prstGeom prst="rect">
@@ -5451,7 +5453,7 @@
           <a:p>
             <a:pPr algn="ctr"/>
             <a:r>
-              <a:rPr lang="en-GB" dirty="0">
+              <a:rPr lang="en-GB" sz="1900" dirty="0">
                 <a:solidFill>
                   <a:schemeClr val="tx1"/>
                 </a:solidFill>
@@ -5480,13 +5482,13 @@
         <p:spPr>
           <a:xfrm>
             <a:off x="2702296" y="2677435"/>
-            <a:ext cx="3404839" cy="13580"/>
+            <a:ext cx="3430638" cy="13580"/>
           </a:xfrm>
           <a:prstGeom prst="straightConnector1">
             <a:avLst/>
           </a:prstGeom>
           <a:ln w="19050">
-            <a:tailEnd type="triangle"/>
+            <a:tailEnd type="triangle" w="lg" len="lg"/>
           </a:ln>
         </p:spPr>
         <p:style>
@@ -5518,8 +5520,8 @@
         </p:nvSpPr>
         <p:spPr>
           <a:xfrm>
-            <a:off x="3160811" y="2405279"/>
-            <a:ext cx="2440214" cy="326844"/>
+            <a:off x="2945017" y="2370110"/>
+            <a:ext cx="2656008" cy="353943"/>
           </a:xfrm>
           <a:prstGeom prst="rect">
             <a:avLst/>
@@ -5534,10 +5536,11 @@
           <a:p>
             <a:pPr algn="ctr"/>
             <a:r>
-              <a:rPr lang="en-GB" sz="1400" i="1" dirty="0">
+              <a:rPr lang="en-GB" sz="1700" i="1" dirty="0">
                 <a:solidFill>
-                  <a:schemeClr val="bg1">
+                  <a:schemeClr val="tx1">
                     <a:lumMod val="50000"/>
+                    <a:lumOff val="50000"/>
                   </a:schemeClr>
                 </a:solidFill>
               </a:rPr>
@@ -5564,17 +5567,17 @@
         </p:nvCxnSpPr>
         <p:spPr>
           <a:xfrm rot="10800000" flipH="1" flipV="1">
-            <a:off x="435033" y="1446396"/>
-            <a:ext cx="2417780" cy="3042958"/>
+            <a:off x="435032" y="1446396"/>
+            <a:ext cx="2382611" cy="3042958"/>
           </a:xfrm>
           <a:prstGeom prst="bentConnector3">
             <a:avLst>
-              <a:gd name="adj1" fmla="val -9455"/>
+              <a:gd name="adj1" fmla="val -9595"/>
             </a:avLst>
           </a:prstGeom>
           <a:ln w="19050">
             <a:prstDash val="sysDash"/>
-            <a:tailEnd type="triangle"/>
+            <a:tailEnd type="triangle" w="lg" len="lg"/>
           </a:ln>
         </p:spPr>
         <p:style>
@@ -5648,7 +5651,7 @@
         </p:nvSpPr>
         <p:spPr>
           <a:xfrm>
-            <a:off x="6118425" y="1041791"/>
+            <a:off x="6132934" y="1041791"/>
             <a:ext cx="2655468" cy="804148"/>
           </a:xfrm>
           <a:prstGeom prst="rect">
@@ -5685,7 +5688,7 @@
           <a:p>
             <a:pPr algn="ctr"/>
             <a:r>
-              <a:rPr lang="en-GB" dirty="0">
+              <a:rPr lang="en-GB" sz="1900" dirty="0">
                 <a:solidFill>
                   <a:schemeClr val="tx1"/>
                 </a:solidFill>
@@ -5696,7 +5699,7 @@
           <a:p>
             <a:pPr algn="ctr"/>
             <a:r>
-              <a:rPr lang="en-GB" dirty="0">
+              <a:rPr lang="en-GB" sz="1900" dirty="0">
                 <a:solidFill>
                   <a:schemeClr val="tx1"/>
                 </a:solidFill>
@@ -5725,13 +5728,13 @@
         <p:spPr>
           <a:xfrm flipV="1">
             <a:off x="2702296" y="1443865"/>
-            <a:ext cx="3416129" cy="2531"/>
+            <a:ext cx="3430638" cy="2531"/>
           </a:xfrm>
           <a:prstGeom prst="straightConnector1">
             <a:avLst/>
           </a:prstGeom>
           <a:ln w="19050">
-            <a:tailEnd type="triangle"/>
+            <a:tailEnd type="triangle" w="lg" len="lg"/>
           </a:ln>
         </p:spPr>
         <p:style>
@@ -5763,8 +5766,8 @@
         </p:nvSpPr>
         <p:spPr>
           <a:xfrm>
-            <a:off x="3147087" y="1163491"/>
-            <a:ext cx="2467662" cy="326844"/>
+            <a:off x="2928866" y="1140045"/>
+            <a:ext cx="2685883" cy="353943"/>
           </a:xfrm>
           <a:prstGeom prst="rect">
             <a:avLst/>
@@ -5779,10 +5782,11 @@
           <a:p>
             <a:pPr algn="ctr"/>
             <a:r>
-              <a:rPr lang="en-GB" sz="1400" i="1" dirty="0">
+              <a:rPr lang="en-GB" sz="1700" i="1" dirty="0">
                 <a:solidFill>
-                  <a:schemeClr val="bg1">
+                  <a:schemeClr val="tx1">
                     <a:lumMod val="50000"/>
+                    <a:lumOff val="50000"/>
                   </a:schemeClr>
                 </a:solidFill>
               </a:rPr>
@@ -5808,7 +5812,7 @@
         </p:nvCxnSpPr>
         <p:spPr>
           <a:xfrm rot="10800000" flipV="1">
-            <a:off x="4400698" y="2788568"/>
+            <a:off x="4365529" y="2788568"/>
             <a:ext cx="1679828" cy="434021"/>
           </a:xfrm>
           <a:prstGeom prst="bentConnector2">
@@ -5816,7 +5820,7 @@
           </a:prstGeom>
           <a:ln w="19050">
             <a:prstDash val="sysDash"/>
-            <a:tailEnd type="triangle"/>
+            <a:tailEnd type="triangle" w="lg" len="lg"/>
           </a:ln>
         </p:spPr>
         <p:style>
@@ -5852,14 +5856,14 @@
         </p:nvCxnSpPr>
         <p:spPr>
           <a:xfrm flipV="1">
-            <a:off x="5948583" y="4485531"/>
-            <a:ext cx="158552" cy="3823"/>
+            <a:off x="5913414" y="4485531"/>
+            <a:ext cx="163904" cy="3823"/>
           </a:xfrm>
           <a:prstGeom prst="straightConnector1">
             <a:avLst/>
           </a:prstGeom>
           <a:ln w="19050">
-            <a:tailEnd type="triangle"/>
+            <a:tailEnd type="triangle" w="lg" len="lg"/>
           </a:ln>
         </p:spPr>
         <p:style>
@@ -5891,8 +5895,8 @@
         </p:nvSpPr>
         <p:spPr>
           <a:xfrm>
-            <a:off x="6107135" y="4083457"/>
-            <a:ext cx="2659807" cy="804148"/>
+            <a:off x="6077318" y="4083457"/>
+            <a:ext cx="2766700" cy="804148"/>
           </a:xfrm>
           <a:prstGeom prst="rect">
             <a:avLst/>
@@ -5928,7 +5932,7 @@
           <a:p>
             <a:pPr algn="ctr"/>
             <a:r>
-              <a:rPr lang="en-GB" dirty="0">
+              <a:rPr lang="en-GB" sz="1900" dirty="0">
                 <a:solidFill>
                   <a:schemeClr val="tx1"/>
                 </a:solidFill>
@@ -5956,16 +5960,16 @@
         </p:nvCxnSpPr>
         <p:spPr>
           <a:xfrm flipV="1">
-            <a:off x="8766942" y="3348979"/>
-            <a:ext cx="272772" cy="1136552"/>
+            <a:off x="8844018" y="3348979"/>
+            <a:ext cx="310627" cy="1136552"/>
           </a:xfrm>
           <a:prstGeom prst="bentConnector3">
             <a:avLst>
-              <a:gd name="adj1" fmla="val 50000"/>
+              <a:gd name="adj1" fmla="val 40401"/>
             </a:avLst>
           </a:prstGeom>
           <a:ln w="19050">
-            <a:tailEnd type="triangle"/>
+            <a:tailEnd type="triangle" w="lg" len="lg"/>
           </a:ln>
         </p:spPr>
         <p:style>
@@ -5997,8 +6001,8 @@
         </p:nvSpPr>
         <p:spPr>
           <a:xfrm>
-            <a:off x="594849" y="4209330"/>
-            <a:ext cx="1807222" cy="307777"/>
+            <a:off x="435032" y="4162438"/>
+            <a:ext cx="2100297" cy="353943"/>
           </a:xfrm>
           <a:prstGeom prst="rect">
             <a:avLst/>
@@ -6013,10 +6017,11 @@
           <a:p>
             <a:pPr algn="ctr"/>
             <a:r>
-              <a:rPr lang="en-GB" sz="1400" i="1" dirty="0">
+              <a:rPr lang="en-GB" sz="1700" i="1" dirty="0">
                 <a:solidFill>
-                  <a:schemeClr val="bg1">
+                  <a:schemeClr val="tx1">
                     <a:lumMod val="50000"/>
+                    <a:lumOff val="50000"/>
                   </a:schemeClr>
                 </a:solidFill>
               </a:rPr>
@@ -6039,8 +6044,8 @@
         </p:nvSpPr>
         <p:spPr>
           <a:xfrm>
-            <a:off x="4251635" y="5787527"/>
-            <a:ext cx="1624624" cy="307777"/>
+            <a:off x="4242143" y="5775804"/>
+            <a:ext cx="1768293" cy="353943"/>
           </a:xfrm>
           <a:prstGeom prst="rect">
             <a:avLst/>
@@ -6055,10 +6060,11 @@
           <a:p>
             <a:pPr algn="ctr"/>
             <a:r>
-              <a:rPr lang="en-GB" sz="1400" i="1" dirty="0">
+              <a:rPr lang="en-GB" sz="1700" i="1" dirty="0">
                 <a:solidFill>
-                  <a:schemeClr val="bg1">
+                  <a:schemeClr val="tx1">
                     <a:lumMod val="50000"/>
+                    <a:lumOff val="50000"/>
                   </a:schemeClr>
                 </a:solidFill>
               </a:rPr>
@@ -6081,8 +6087,8 @@
         </p:nvSpPr>
         <p:spPr>
           <a:xfrm>
-            <a:off x="4251635" y="2776129"/>
-            <a:ext cx="1624624" cy="307777"/>
+            <a:off x="4242143" y="2776129"/>
+            <a:ext cx="1768293" cy="353943"/>
           </a:xfrm>
           <a:prstGeom prst="rect">
             <a:avLst/>
@@ -6097,10 +6103,11 @@
           <a:p>
             <a:pPr algn="ctr"/>
             <a:r>
-              <a:rPr lang="en-GB" sz="1400" i="1" dirty="0">
+              <a:rPr lang="en-GB" sz="1700" i="1" dirty="0">
                 <a:solidFill>
-                  <a:schemeClr val="bg1">
+                  <a:schemeClr val="tx1">
                     <a:lumMod val="50000"/>
+                    <a:lumOff val="50000"/>
                   </a:schemeClr>
                 </a:solidFill>
               </a:rPr>
@@ -6123,8 +6130,8 @@
         </p:nvSpPr>
         <p:spPr>
           <a:xfrm>
-            <a:off x="104172" y="375393"/>
-            <a:ext cx="2773931" cy="369332"/>
+            <a:off x="104172" y="201119"/>
+            <a:ext cx="2773931" cy="400110"/>
           </a:xfrm>
           <a:prstGeom prst="rect">
             <a:avLst/>
@@ -6139,7 +6146,7 @@
           <a:p>
             <a:pPr algn="ctr"/>
             <a:r>
-              <a:rPr lang="en-GB" b="1" dirty="0">
+              <a:rPr lang="en-GB" sz="2000" b="1" dirty="0">
                 <a:solidFill>
                   <a:schemeClr val="bg1">
                     <a:lumMod val="50000"/>
@@ -6165,8 +6172,8 @@
         </p:nvSpPr>
         <p:spPr>
           <a:xfrm>
-            <a:off x="3181884" y="378536"/>
-            <a:ext cx="2432161" cy="369332"/>
+            <a:off x="3255491" y="201119"/>
+            <a:ext cx="2432161" cy="400110"/>
           </a:xfrm>
           <a:prstGeom prst="rect">
             <a:avLst/>
@@ -6181,7 +6188,7 @@
           <a:p>
             <a:pPr algn="ctr"/>
             <a:r>
-              <a:rPr lang="en-GB" b="1" dirty="0">
+              <a:rPr lang="en-GB" sz="2000" b="1" dirty="0">
                 <a:solidFill>
                   <a:schemeClr val="bg1">
                     <a:lumMod val="50000"/>
@@ -6207,8 +6214,8 @@
         </p:nvSpPr>
         <p:spPr>
           <a:xfrm>
-            <a:off x="5978237" y="375393"/>
-            <a:ext cx="2624072" cy="369332"/>
+            <a:off x="6065040" y="201119"/>
+            <a:ext cx="2624072" cy="400110"/>
           </a:xfrm>
           <a:prstGeom prst="rect">
             <a:avLst/>
@@ -6223,7 +6230,7 @@
           <a:p>
             <a:pPr algn="ctr"/>
             <a:r>
-              <a:rPr lang="en-GB" b="1" dirty="0">
+              <a:rPr lang="en-GB" sz="2000" b="1" dirty="0">
                 <a:solidFill>
                   <a:schemeClr val="bg1">
                     <a:lumMod val="50000"/>
@@ -6249,8 +6256,8 @@
         </p:nvSpPr>
         <p:spPr>
           <a:xfrm>
-            <a:off x="9066499" y="378536"/>
-            <a:ext cx="2624072" cy="369332"/>
+            <a:off x="9066499" y="201119"/>
+            <a:ext cx="2624072" cy="400110"/>
           </a:xfrm>
           <a:prstGeom prst="rect">
             <a:avLst/>
@@ -6265,7 +6272,7 @@
           <a:p>
             <a:pPr algn="ctr"/>
             <a:r>
-              <a:rPr lang="en-GB" b="1" dirty="0">
+              <a:rPr lang="en-GB" sz="2000" b="1" dirty="0">
                 <a:solidFill>
                   <a:schemeClr val="bg1">
                     <a:lumMod val="50000"/>
@@ -6292,7 +6299,7 @@
         <p:spPr>
           <a:xfrm>
             <a:off x="110587" y="138897"/>
-            <a:ext cx="11869210" cy="6427003"/>
+            <a:ext cx="11970824" cy="6427003"/>
           </a:xfrm>
           <a:prstGeom prst="rect">
             <a:avLst/>
@@ -6347,15 +6354,15 @@
         </p:nvCxnSpPr>
         <p:spPr>
           <a:xfrm rot="10800000">
-            <a:off x="4400699" y="5756119"/>
-            <a:ext cx="1706437" cy="345629"/>
+            <a:off x="4365529" y="5756119"/>
+            <a:ext cx="1765236" cy="345629"/>
           </a:xfrm>
           <a:prstGeom prst="bentConnector2">
             <a:avLst/>
           </a:prstGeom>
           <a:ln w="19050">
             <a:prstDash val="sysDash"/>
-            <a:tailEnd type="triangle"/>
+            <a:tailEnd type="triangle" w="lg" len="lg"/>
           </a:ln>
         </p:spPr>
         <p:style>
@@ -6387,7 +6394,7 @@
         </p:nvSpPr>
         <p:spPr>
           <a:xfrm>
-            <a:off x="2852813" y="3222590"/>
+            <a:off x="2817644" y="3222590"/>
             <a:ext cx="3095770" cy="2533528"/>
           </a:xfrm>
           <a:prstGeom prst="rect">
@@ -6443,8 +6450,8 @@
         </p:nvCxnSpPr>
         <p:spPr>
           <a:xfrm>
-            <a:off x="8773893" y="1443865"/>
-            <a:ext cx="265821" cy="1905114"/>
+            <a:off x="8788402" y="1443865"/>
+            <a:ext cx="366243" cy="1905114"/>
           </a:xfrm>
           <a:prstGeom prst="bentConnector3">
             <a:avLst>
@@ -6452,7 +6459,7 @@
             </a:avLst>
           </a:prstGeom>
           <a:ln w="19050">
-            <a:tailEnd type="triangle"/>
+            <a:tailEnd type="triangle" w="lg" len="lg"/>
           </a:ln>
         </p:spPr>
         <p:style>
@@ -6498,7 +6505,7 @@
         </p:blipFill>
         <p:spPr>
           <a:xfrm>
-            <a:off x="2867602" y="3499187"/>
+            <a:off x="2832433" y="3499187"/>
             <a:ext cx="3069904" cy="2251089"/>
           </a:xfrm>
           <a:prstGeom prst="rect">
@@ -6520,7 +6527,7 @@
         </p:nvSpPr>
         <p:spPr>
           <a:xfrm>
-            <a:off x="3468603" y="2987012"/>
+            <a:off x="3433434" y="2987012"/>
             <a:ext cx="2208228" cy="804148"/>
           </a:xfrm>
           <a:prstGeom prst="rect">
@@ -6553,7 +6560,7 @@
           <a:p>
             <a:pPr algn="ctr"/>
             <a:r>
-              <a:rPr lang="en-GB" dirty="0">
+              <a:rPr lang="en-GB" sz="1900" dirty="0">
                 <a:solidFill>
                   <a:schemeClr val="tx1"/>
                 </a:solidFill>

</xml_diff>

<commit_message>
start working on the final figures of the manuscript - final changes to cross validation
</commit_message>
<xml_diff>
--- a/figures/interpolation_concept.pptx
+++ b/figures/interpolation_concept.pptx
@@ -4,6 +4,9 @@
   <p:sldMasterIdLst>
     <p:sldMasterId id="2147483648" r:id="rId1"/>
   </p:sldMasterIdLst>
+  <p:notesMasterIdLst>
+    <p:notesMasterId r:id="rId7"/>
+  </p:notesMasterIdLst>
   <p:sldIdLst>
     <p:sldId id="262" r:id="rId2"/>
     <p:sldId id="268" r:id="rId3"/>
@@ -116,6 +119,440 @@
 </p:presentation>
 </file>
 
+<file path=ppt/notesMasters/notesMaster1.xml><?xml version="1.0" encoding="utf-8"?>
+<p:notesMaster xmlns:a="http://schemas.openxmlformats.org/drawingml/2006/main" xmlns:r="http://schemas.openxmlformats.org/officeDocument/2006/relationships" xmlns:p="http://schemas.openxmlformats.org/presentationml/2006/main">
+  <p:cSld>
+    <p:bg>
+      <p:bgRef idx="1001">
+        <a:schemeClr val="bg1"/>
+      </p:bgRef>
+    </p:bg>
+    <p:spTree>
+      <p:nvGrpSpPr>
+        <p:cNvPr id="1" name=""/>
+        <p:cNvGrpSpPr/>
+        <p:nvPr/>
+      </p:nvGrpSpPr>
+      <p:grpSpPr>
+        <a:xfrm>
+          <a:off x="0" y="0"/>
+          <a:ext cx="0" cy="0"/>
+          <a:chOff x="0" y="0"/>
+          <a:chExt cx="0" cy="0"/>
+        </a:xfrm>
+      </p:grpSpPr>
+      <p:sp>
+        <p:nvSpPr>
+          <p:cNvPr id="2" name="Header Placeholder 1"/>
+          <p:cNvSpPr>
+            <a:spLocks noGrp="1"/>
+          </p:cNvSpPr>
+          <p:nvPr>
+            <p:ph type="hdr" sz="quarter"/>
+          </p:nvPr>
+        </p:nvSpPr>
+        <p:spPr>
+          <a:xfrm>
+            <a:off x="0" y="0"/>
+            <a:ext cx="2971800" cy="458788"/>
+          </a:xfrm>
+          <a:prstGeom prst="rect">
+            <a:avLst/>
+          </a:prstGeom>
+        </p:spPr>
+        <p:txBody>
+          <a:bodyPr vert="horz" lIns="91440" tIns="45720" rIns="91440" bIns="45720" rtlCol="0"/>
+          <a:lstStyle>
+            <a:lvl1pPr algn="l">
+              <a:defRPr sz="1200"/>
+            </a:lvl1pPr>
+          </a:lstStyle>
+          <a:p>
+            <a:endParaRPr lang="en-DE"/>
+          </a:p>
+        </p:txBody>
+      </p:sp>
+      <p:sp>
+        <p:nvSpPr>
+          <p:cNvPr id="3" name="Date Placeholder 2"/>
+          <p:cNvSpPr>
+            <a:spLocks noGrp="1"/>
+          </p:cNvSpPr>
+          <p:nvPr>
+            <p:ph type="dt" idx="1"/>
+          </p:nvPr>
+        </p:nvSpPr>
+        <p:spPr>
+          <a:xfrm>
+            <a:off x="3884613" y="0"/>
+            <a:ext cx="2971800" cy="458788"/>
+          </a:xfrm>
+          <a:prstGeom prst="rect">
+            <a:avLst/>
+          </a:prstGeom>
+        </p:spPr>
+        <p:txBody>
+          <a:bodyPr vert="horz" lIns="91440" tIns="45720" rIns="91440" bIns="45720" rtlCol="0"/>
+          <a:lstStyle>
+            <a:lvl1pPr algn="r">
+              <a:defRPr sz="1200"/>
+            </a:lvl1pPr>
+          </a:lstStyle>
+          <a:p>
+            <a:fld id="{19CA3A34-E4BA-5247-8CC4-27519C13B895}" type="datetimeFigureOut">
+              <a:rPr lang="en-DE" smtClean="0"/>
+              <a:t>01.06.21</a:t>
+            </a:fld>
+            <a:endParaRPr lang="en-DE"/>
+          </a:p>
+        </p:txBody>
+      </p:sp>
+      <p:sp>
+        <p:nvSpPr>
+          <p:cNvPr id="4" name="Slide Image Placeholder 3"/>
+          <p:cNvSpPr>
+            <a:spLocks noGrp="1" noRot="1" noChangeAspect="1"/>
+          </p:cNvSpPr>
+          <p:nvPr>
+            <p:ph type="sldImg" idx="2"/>
+          </p:nvPr>
+        </p:nvSpPr>
+        <p:spPr>
+          <a:xfrm>
+            <a:off x="685800" y="1143000"/>
+            <a:ext cx="5486400" cy="3086100"/>
+          </a:xfrm>
+          <a:prstGeom prst="rect">
+            <a:avLst/>
+          </a:prstGeom>
+          <a:noFill/>
+          <a:ln w="12700">
+            <a:solidFill>
+              <a:prstClr val="black"/>
+            </a:solidFill>
+          </a:ln>
+        </p:spPr>
+        <p:txBody>
+          <a:bodyPr vert="horz" lIns="91440" tIns="45720" rIns="91440" bIns="45720" rtlCol="0" anchor="ctr"/>
+          <a:lstStyle/>
+          <a:p>
+            <a:endParaRPr lang="en-DE"/>
+          </a:p>
+        </p:txBody>
+      </p:sp>
+      <p:sp>
+        <p:nvSpPr>
+          <p:cNvPr id="5" name="Notes Placeholder 4"/>
+          <p:cNvSpPr>
+            <a:spLocks noGrp="1"/>
+          </p:cNvSpPr>
+          <p:nvPr>
+            <p:ph type="body" sz="quarter" idx="3"/>
+          </p:nvPr>
+        </p:nvSpPr>
+        <p:spPr>
+          <a:xfrm>
+            <a:off x="685800" y="4400550"/>
+            <a:ext cx="5486400" cy="3600450"/>
+          </a:xfrm>
+          <a:prstGeom prst="rect">
+            <a:avLst/>
+          </a:prstGeom>
+        </p:spPr>
+        <p:txBody>
+          <a:bodyPr vert="horz" lIns="91440" tIns="45720" rIns="91440" bIns="45720" rtlCol="0"/>
+          <a:lstStyle/>
+          <a:p>
+            <a:pPr lvl="0"/>
+            <a:r>
+              <a:rPr lang="en-GB"/>
+              <a:t>Click to edit Master text styles</a:t>
+            </a:r>
+          </a:p>
+          <a:p>
+            <a:pPr lvl="1"/>
+            <a:r>
+              <a:rPr lang="en-GB"/>
+              <a:t>Second level</a:t>
+            </a:r>
+          </a:p>
+          <a:p>
+            <a:pPr lvl="2"/>
+            <a:r>
+              <a:rPr lang="en-GB"/>
+              <a:t>Third level</a:t>
+            </a:r>
+          </a:p>
+          <a:p>
+            <a:pPr lvl="3"/>
+            <a:r>
+              <a:rPr lang="en-GB"/>
+              <a:t>Fourth level</a:t>
+            </a:r>
+          </a:p>
+          <a:p>
+            <a:pPr lvl="4"/>
+            <a:r>
+              <a:rPr lang="en-GB"/>
+              <a:t>Fifth level</a:t>
+            </a:r>
+            <a:endParaRPr lang="en-DE"/>
+          </a:p>
+        </p:txBody>
+      </p:sp>
+      <p:sp>
+        <p:nvSpPr>
+          <p:cNvPr id="6" name="Footer Placeholder 5"/>
+          <p:cNvSpPr>
+            <a:spLocks noGrp="1"/>
+          </p:cNvSpPr>
+          <p:nvPr>
+            <p:ph type="ftr" sz="quarter" idx="4"/>
+          </p:nvPr>
+        </p:nvSpPr>
+        <p:spPr>
+          <a:xfrm>
+            <a:off x="0" y="8685213"/>
+            <a:ext cx="2971800" cy="458787"/>
+          </a:xfrm>
+          <a:prstGeom prst="rect">
+            <a:avLst/>
+          </a:prstGeom>
+        </p:spPr>
+        <p:txBody>
+          <a:bodyPr vert="horz" lIns="91440" tIns="45720" rIns="91440" bIns="45720" rtlCol="0" anchor="b"/>
+          <a:lstStyle>
+            <a:lvl1pPr algn="l">
+              <a:defRPr sz="1200"/>
+            </a:lvl1pPr>
+          </a:lstStyle>
+          <a:p>
+            <a:endParaRPr lang="en-DE"/>
+          </a:p>
+        </p:txBody>
+      </p:sp>
+      <p:sp>
+        <p:nvSpPr>
+          <p:cNvPr id="7" name="Slide Number Placeholder 6"/>
+          <p:cNvSpPr>
+            <a:spLocks noGrp="1"/>
+          </p:cNvSpPr>
+          <p:nvPr>
+            <p:ph type="sldNum" sz="quarter" idx="5"/>
+          </p:nvPr>
+        </p:nvSpPr>
+        <p:spPr>
+          <a:xfrm>
+            <a:off x="3884613" y="8685213"/>
+            <a:ext cx="2971800" cy="458787"/>
+          </a:xfrm>
+          <a:prstGeom prst="rect">
+            <a:avLst/>
+          </a:prstGeom>
+        </p:spPr>
+        <p:txBody>
+          <a:bodyPr vert="horz" lIns="91440" tIns="45720" rIns="91440" bIns="45720" rtlCol="0" anchor="b"/>
+          <a:lstStyle>
+            <a:lvl1pPr algn="r">
+              <a:defRPr sz="1200"/>
+            </a:lvl1pPr>
+          </a:lstStyle>
+          <a:p>
+            <a:fld id="{B933B3C8-F7B9-D140-9D83-B903D18ACFDA}" type="slidenum">
+              <a:rPr lang="en-DE" smtClean="0"/>
+              <a:t>‹#›</a:t>
+            </a:fld>
+            <a:endParaRPr lang="en-DE"/>
+          </a:p>
+        </p:txBody>
+      </p:sp>
+    </p:spTree>
+    <p:extLst>
+      <p:ext uri="{BB962C8B-B14F-4D97-AF65-F5344CB8AC3E}">
+        <p14:creationId xmlns:p14="http://schemas.microsoft.com/office/powerpoint/2010/main" val="2638027712"/>
+      </p:ext>
+    </p:extLst>
+  </p:cSld>
+  <p:clrMap bg1="lt1" tx1="dk1" bg2="lt2" tx2="dk2" accent1="accent1" accent2="accent2" accent3="accent3" accent4="accent4" accent5="accent5" accent6="accent6" hlink="hlink" folHlink="folHlink"/>
+  <p:notesStyle>
+    <a:lvl1pPr marL="0" algn="l" defTabSz="914400" rtl="0" eaLnBrk="1" latinLnBrk="0" hangingPunct="1">
+      <a:defRPr sz="1200" kern="1200">
+        <a:solidFill>
+          <a:schemeClr val="tx1"/>
+        </a:solidFill>
+        <a:latin typeface="+mn-lt"/>
+        <a:ea typeface="+mn-ea"/>
+        <a:cs typeface="+mn-cs"/>
+      </a:defRPr>
+    </a:lvl1pPr>
+    <a:lvl2pPr marL="457200" algn="l" defTabSz="914400" rtl="0" eaLnBrk="1" latinLnBrk="0" hangingPunct="1">
+      <a:defRPr sz="1200" kern="1200">
+        <a:solidFill>
+          <a:schemeClr val="tx1"/>
+        </a:solidFill>
+        <a:latin typeface="+mn-lt"/>
+        <a:ea typeface="+mn-ea"/>
+        <a:cs typeface="+mn-cs"/>
+      </a:defRPr>
+    </a:lvl2pPr>
+    <a:lvl3pPr marL="914400" algn="l" defTabSz="914400" rtl="0" eaLnBrk="1" latinLnBrk="0" hangingPunct="1">
+      <a:defRPr sz="1200" kern="1200">
+        <a:solidFill>
+          <a:schemeClr val="tx1"/>
+        </a:solidFill>
+        <a:latin typeface="+mn-lt"/>
+        <a:ea typeface="+mn-ea"/>
+        <a:cs typeface="+mn-cs"/>
+      </a:defRPr>
+    </a:lvl3pPr>
+    <a:lvl4pPr marL="1371600" algn="l" defTabSz="914400" rtl="0" eaLnBrk="1" latinLnBrk="0" hangingPunct="1">
+      <a:defRPr sz="1200" kern="1200">
+        <a:solidFill>
+          <a:schemeClr val="tx1"/>
+        </a:solidFill>
+        <a:latin typeface="+mn-lt"/>
+        <a:ea typeface="+mn-ea"/>
+        <a:cs typeface="+mn-cs"/>
+      </a:defRPr>
+    </a:lvl4pPr>
+    <a:lvl5pPr marL="1828800" algn="l" defTabSz="914400" rtl="0" eaLnBrk="1" latinLnBrk="0" hangingPunct="1">
+      <a:defRPr sz="1200" kern="1200">
+        <a:solidFill>
+          <a:schemeClr val="tx1"/>
+        </a:solidFill>
+        <a:latin typeface="+mn-lt"/>
+        <a:ea typeface="+mn-ea"/>
+        <a:cs typeface="+mn-cs"/>
+      </a:defRPr>
+    </a:lvl5pPr>
+    <a:lvl6pPr marL="2286000" algn="l" defTabSz="914400" rtl="0" eaLnBrk="1" latinLnBrk="0" hangingPunct="1">
+      <a:defRPr sz="1200" kern="1200">
+        <a:solidFill>
+          <a:schemeClr val="tx1"/>
+        </a:solidFill>
+        <a:latin typeface="+mn-lt"/>
+        <a:ea typeface="+mn-ea"/>
+        <a:cs typeface="+mn-cs"/>
+      </a:defRPr>
+    </a:lvl6pPr>
+    <a:lvl7pPr marL="2743200" algn="l" defTabSz="914400" rtl="0" eaLnBrk="1" latinLnBrk="0" hangingPunct="1">
+      <a:defRPr sz="1200" kern="1200">
+        <a:solidFill>
+          <a:schemeClr val="tx1"/>
+        </a:solidFill>
+        <a:latin typeface="+mn-lt"/>
+        <a:ea typeface="+mn-ea"/>
+        <a:cs typeface="+mn-cs"/>
+      </a:defRPr>
+    </a:lvl7pPr>
+    <a:lvl8pPr marL="3200400" algn="l" defTabSz="914400" rtl="0" eaLnBrk="1" latinLnBrk="0" hangingPunct="1">
+      <a:defRPr sz="1200" kern="1200">
+        <a:solidFill>
+          <a:schemeClr val="tx1"/>
+        </a:solidFill>
+        <a:latin typeface="+mn-lt"/>
+        <a:ea typeface="+mn-ea"/>
+        <a:cs typeface="+mn-cs"/>
+      </a:defRPr>
+    </a:lvl8pPr>
+    <a:lvl9pPr marL="3657600" algn="l" defTabSz="914400" rtl="0" eaLnBrk="1" latinLnBrk="0" hangingPunct="1">
+      <a:defRPr sz="1200" kern="1200">
+        <a:solidFill>
+          <a:schemeClr val="tx1"/>
+        </a:solidFill>
+        <a:latin typeface="+mn-lt"/>
+        <a:ea typeface="+mn-ea"/>
+        <a:cs typeface="+mn-cs"/>
+      </a:defRPr>
+    </a:lvl9pPr>
+  </p:notesStyle>
+</p:notesMaster>
+</file>
+
+<file path=ppt/notesSlides/notesSlide1.xml><?xml version="1.0" encoding="utf-8"?>
+<p:notes xmlns:a="http://schemas.openxmlformats.org/drawingml/2006/main" xmlns:r="http://schemas.openxmlformats.org/officeDocument/2006/relationships" xmlns:p="http://schemas.openxmlformats.org/presentationml/2006/main">
+  <p:cSld>
+    <p:spTree>
+      <p:nvGrpSpPr>
+        <p:cNvPr id="1" name=""/>
+        <p:cNvGrpSpPr/>
+        <p:nvPr/>
+      </p:nvGrpSpPr>
+      <p:grpSpPr>
+        <a:xfrm>
+          <a:off x="0" y="0"/>
+          <a:ext cx="0" cy="0"/>
+          <a:chOff x="0" y="0"/>
+          <a:chExt cx="0" cy="0"/>
+        </a:xfrm>
+      </p:grpSpPr>
+      <p:sp>
+        <p:nvSpPr>
+          <p:cNvPr id="2" name="Slide Image Placeholder 1"/>
+          <p:cNvSpPr>
+            <a:spLocks noGrp="1" noRot="1" noChangeAspect="1"/>
+          </p:cNvSpPr>
+          <p:nvPr>
+            <p:ph type="sldImg"/>
+          </p:nvPr>
+        </p:nvSpPr>
+        <p:spPr/>
+      </p:sp>
+      <p:sp>
+        <p:nvSpPr>
+          <p:cNvPr id="3" name="Notes Placeholder 2"/>
+          <p:cNvSpPr>
+            <a:spLocks noGrp="1"/>
+          </p:cNvSpPr>
+          <p:nvPr>
+            <p:ph type="body" idx="1"/>
+          </p:nvPr>
+        </p:nvSpPr>
+        <p:spPr/>
+        <p:txBody>
+          <a:bodyPr/>
+          <a:lstStyle/>
+          <a:p>
+            <a:endParaRPr lang="en-DE" dirty="0"/>
+          </a:p>
+        </p:txBody>
+      </p:sp>
+      <p:sp>
+        <p:nvSpPr>
+          <p:cNvPr id="4" name="Slide Number Placeholder 3"/>
+          <p:cNvSpPr>
+            <a:spLocks noGrp="1"/>
+          </p:cNvSpPr>
+          <p:nvPr>
+            <p:ph type="sldNum" sz="quarter" idx="5"/>
+          </p:nvPr>
+        </p:nvSpPr>
+        <p:spPr/>
+        <p:txBody>
+          <a:bodyPr/>
+          <a:lstStyle/>
+          <a:p>
+            <a:fld id="{B933B3C8-F7B9-D140-9D83-B903D18ACFDA}" type="slidenum">
+              <a:rPr lang="en-DE" smtClean="0"/>
+              <a:t>2</a:t>
+            </a:fld>
+            <a:endParaRPr lang="en-DE"/>
+          </a:p>
+        </p:txBody>
+      </p:sp>
+    </p:spTree>
+    <p:extLst>
+      <p:ext uri="{BB962C8B-B14F-4D97-AF65-F5344CB8AC3E}">
+        <p14:creationId xmlns:p14="http://schemas.microsoft.com/office/powerpoint/2010/main" val="4170262724"/>
+      </p:ext>
+    </p:extLst>
+  </p:cSld>
+  <p:clrMapOvr>
+    <a:masterClrMapping/>
+  </p:clrMapOvr>
+</p:notes>
+</file>
+
 <file path=ppt/slideLayouts/slideLayout1.xml><?xml version="1.0" encoding="utf-8"?>
 <p:sldLayout xmlns:a="http://schemas.openxmlformats.org/drawingml/2006/main" xmlns:r="http://schemas.openxmlformats.org/officeDocument/2006/relationships" xmlns:p="http://schemas.openxmlformats.org/presentationml/2006/main" type="title" preserve="1">
   <p:cSld name="Titelfolie">
@@ -263,7 +700,7 @@
           <a:p>
             <a:fld id="{AFEDA113-42A8-4B4B-8FAE-0FFA23006852}" type="datetimeFigureOut">
               <a:rPr lang="de-DE" smtClean="0"/>
-              <a:t>27.05.21</a:t>
+              <a:t>01.06.21</a:t>
             </a:fld>
             <a:endParaRPr lang="de-DE"/>
           </a:p>
@@ -461,7 +898,7 @@
           <a:p>
             <a:fld id="{AFEDA113-42A8-4B4B-8FAE-0FFA23006852}" type="datetimeFigureOut">
               <a:rPr lang="de-DE" smtClean="0"/>
-              <a:t>27.05.21</a:t>
+              <a:t>01.06.21</a:t>
             </a:fld>
             <a:endParaRPr lang="de-DE"/>
           </a:p>
@@ -669,7 +1106,7 @@
           <a:p>
             <a:fld id="{AFEDA113-42A8-4B4B-8FAE-0FFA23006852}" type="datetimeFigureOut">
               <a:rPr lang="de-DE" smtClean="0"/>
-              <a:t>27.05.21</a:t>
+              <a:t>01.06.21</a:t>
             </a:fld>
             <a:endParaRPr lang="de-DE"/>
           </a:p>
@@ -867,7 +1304,7 @@
           <a:p>
             <a:fld id="{AFEDA113-42A8-4B4B-8FAE-0FFA23006852}" type="datetimeFigureOut">
               <a:rPr lang="de-DE" smtClean="0"/>
-              <a:t>27.05.21</a:t>
+              <a:t>01.06.21</a:t>
             </a:fld>
             <a:endParaRPr lang="de-DE"/>
           </a:p>
@@ -1142,7 +1579,7 @@
           <a:p>
             <a:fld id="{AFEDA113-42A8-4B4B-8FAE-0FFA23006852}" type="datetimeFigureOut">
               <a:rPr lang="de-DE" smtClean="0"/>
-              <a:t>27.05.21</a:t>
+              <a:t>01.06.21</a:t>
             </a:fld>
             <a:endParaRPr lang="de-DE"/>
           </a:p>
@@ -1407,7 +1844,7 @@
           <a:p>
             <a:fld id="{AFEDA113-42A8-4B4B-8FAE-0FFA23006852}" type="datetimeFigureOut">
               <a:rPr lang="de-DE" smtClean="0"/>
-              <a:t>27.05.21</a:t>
+              <a:t>01.06.21</a:t>
             </a:fld>
             <a:endParaRPr lang="de-DE"/>
           </a:p>
@@ -1819,7 +2256,7 @@
           <a:p>
             <a:fld id="{AFEDA113-42A8-4B4B-8FAE-0FFA23006852}" type="datetimeFigureOut">
               <a:rPr lang="de-DE" smtClean="0"/>
-              <a:t>27.05.21</a:t>
+              <a:t>01.06.21</a:t>
             </a:fld>
             <a:endParaRPr lang="de-DE"/>
           </a:p>
@@ -1960,7 +2397,7 @@
           <a:p>
             <a:fld id="{AFEDA113-42A8-4B4B-8FAE-0FFA23006852}" type="datetimeFigureOut">
               <a:rPr lang="de-DE" smtClean="0"/>
-              <a:t>27.05.21</a:t>
+              <a:t>01.06.21</a:t>
             </a:fld>
             <a:endParaRPr lang="de-DE"/>
           </a:p>
@@ -2073,7 +2510,7 @@
           <a:p>
             <a:fld id="{AFEDA113-42A8-4B4B-8FAE-0FFA23006852}" type="datetimeFigureOut">
               <a:rPr lang="de-DE" smtClean="0"/>
-              <a:t>27.05.21</a:t>
+              <a:t>01.06.21</a:t>
             </a:fld>
             <a:endParaRPr lang="de-DE"/>
           </a:p>
@@ -2384,7 +2821,7 @@
           <a:p>
             <a:fld id="{AFEDA113-42A8-4B4B-8FAE-0FFA23006852}" type="datetimeFigureOut">
               <a:rPr lang="de-DE" smtClean="0"/>
-              <a:t>27.05.21</a:t>
+              <a:t>01.06.21</a:t>
             </a:fld>
             <a:endParaRPr lang="de-DE"/>
           </a:p>
@@ -2672,7 +3109,7 @@
           <a:p>
             <a:fld id="{AFEDA113-42A8-4B4B-8FAE-0FFA23006852}" type="datetimeFigureOut">
               <a:rPr lang="de-DE" smtClean="0"/>
-              <a:t>27.05.21</a:t>
+              <a:t>01.06.21</a:t>
             </a:fld>
             <a:endParaRPr lang="de-DE"/>
           </a:p>
@@ -2913,7 +3350,7 @@
           <a:p>
             <a:fld id="{AFEDA113-42A8-4B4B-8FAE-0FFA23006852}" type="datetimeFigureOut">
               <a:rPr lang="de-DE" smtClean="0"/>
-              <a:t>27.05.21</a:t>
+              <a:t>01.06.21</a:t>
             </a:fld>
             <a:endParaRPr lang="de-DE"/>
           </a:p>
@@ -4821,164 +5258,29 @@
           <a:chExt cx="0" cy="0"/>
         </a:xfrm>
       </p:grpSpPr>
-      <p:grpSp>
-        <p:nvGrpSpPr>
-          <p:cNvPr id="12" name="Group 11">
-            <a:extLst>
-              <a:ext uri="{FF2B5EF4-FFF2-40B4-BE49-F238E27FC236}">
-                <a16:creationId xmlns:a16="http://schemas.microsoft.com/office/drawing/2014/main" id="{46451D2C-3348-C24A-BB56-54ABF2B8F502}"/>
-              </a:ext>
-            </a:extLst>
-          </p:cNvPr>
-          <p:cNvGrpSpPr>
-            <a:grpSpLocks noChangeAspect="1"/>
-          </p:cNvGrpSpPr>
+      <p:sp>
+        <p:nvSpPr>
+          <p:cNvPr id="110" name="Rechteck 76">
+            <a:extLst>
+              <a:ext uri="{FF2B5EF4-FFF2-40B4-BE49-F238E27FC236}">
+                <a16:creationId xmlns:a16="http://schemas.microsoft.com/office/drawing/2014/main" id="{E4C4C69F-CC1E-CC4F-8EA2-0B855D5A35D3}"/>
+              </a:ext>
+            </a:extLst>
+          </p:cNvPr>
+          <p:cNvSpPr/>
           <p:nvPr/>
-        </p:nvGrpSpPr>
-        <p:grpSpPr>
+        </p:nvSpPr>
+        <p:spPr>
           <a:xfrm>
-            <a:off x="9104235" y="1473694"/>
-            <a:ext cx="2875562" cy="4244787"/>
-            <a:chOff x="8166686" y="2226858"/>
-            <a:chExt cx="2252310" cy="3324768"/>
-          </a:xfrm>
-        </p:grpSpPr>
-        <p:pic>
-          <p:nvPicPr>
-            <p:cNvPr id="10" name="Picture 9">
-              <a:extLst>
-                <a:ext uri="{FF2B5EF4-FFF2-40B4-BE49-F238E27FC236}">
-                  <a16:creationId xmlns:a16="http://schemas.microsoft.com/office/drawing/2014/main" id="{C08456A9-4451-604A-8F85-6D34FAB19D3E}"/>
-                </a:ext>
-              </a:extLst>
-            </p:cNvPr>
-            <p:cNvPicPr>
-              <a:picLocks noChangeAspect="1"/>
-            </p:cNvPicPr>
-            <p:nvPr/>
-          </p:nvPicPr>
-          <p:blipFill rotWithShape="1">
-            <a:blip r:embed="rId2">
-              <a:extLst>
-                <a:ext uri="{28A0092B-C50C-407E-A947-70E740481C1C}">
-                  <a14:useLocalDpi xmlns:a14="http://schemas.microsoft.com/office/drawing/2010/main" val="0"/>
-                </a:ext>
-              </a:extLst>
-            </a:blip>
-            <a:srcRect t="2899" r="29463"/>
-            <a:stretch/>
-          </p:blipFill>
-          <p:spPr>
-            <a:xfrm>
-              <a:off x="8166686" y="2226858"/>
-              <a:ext cx="2231468" cy="3324768"/>
-            </a:xfrm>
-            <a:prstGeom prst="rect">
-              <a:avLst/>
-            </a:prstGeom>
-          </p:spPr>
-        </p:pic>
-        <p:pic>
-          <p:nvPicPr>
-            <p:cNvPr id="42" name="Picture 41">
-              <a:extLst>
-                <a:ext uri="{FF2B5EF4-FFF2-40B4-BE49-F238E27FC236}">
-                  <a16:creationId xmlns:a16="http://schemas.microsoft.com/office/drawing/2014/main" id="{35B1A144-BCF1-534A-8CFA-D324C8881E10}"/>
-                </a:ext>
-              </a:extLst>
-            </p:cNvPr>
-            <p:cNvPicPr>
-              <a:picLocks noChangeAspect="1"/>
-            </p:cNvPicPr>
-            <p:nvPr/>
-          </p:nvPicPr>
-          <p:blipFill rotWithShape="1">
-            <a:blip r:embed="rId2">
-              <a:extLst>
-                <a:ext uri="{28A0092B-C50C-407E-A947-70E740481C1C}">
-                  <a14:useLocalDpi xmlns:a14="http://schemas.microsoft.com/office/drawing/2010/main" val="0"/>
-                </a:ext>
-              </a:extLst>
-            </a:blip>
-            <a:srcRect l="71038" t="22725" r="16486" b="45471"/>
-            <a:stretch/>
-          </p:blipFill>
-          <p:spPr>
-            <a:xfrm>
-              <a:off x="9970083" y="4177252"/>
-              <a:ext cx="335058" cy="924465"/>
-            </a:xfrm>
-            <a:prstGeom prst="rect">
-              <a:avLst/>
-            </a:prstGeom>
-          </p:spPr>
-        </p:pic>
-        <p:sp>
-          <p:nvSpPr>
-            <p:cNvPr id="11" name="TextBox 10">
-              <a:extLst>
-                <a:ext uri="{FF2B5EF4-FFF2-40B4-BE49-F238E27FC236}">
-                  <a16:creationId xmlns:a16="http://schemas.microsoft.com/office/drawing/2014/main" id="{FE334E13-5D3E-1D4E-A3E5-E4E108486248}"/>
-                </a:ext>
-              </a:extLst>
-            </p:cNvPr>
-            <p:cNvSpPr txBox="1"/>
-            <p:nvPr/>
-          </p:nvSpPr>
-          <p:spPr>
-            <a:xfrm>
-              <a:off x="9809043" y="3891652"/>
-              <a:ext cx="609953" cy="337496"/>
-            </a:xfrm>
-            <a:prstGeom prst="rect">
-              <a:avLst/>
-            </a:prstGeom>
-            <a:noFill/>
-          </p:spPr>
-          <p:txBody>
-            <a:bodyPr wrap="square" rtlCol="0">
-              <a:spAutoFit/>
-            </a:bodyPr>
-            <a:lstStyle/>
-            <a:p>
-              <a:pPr algn="ctr"/>
-              <a:r>
-                <a:rPr lang="en-DE" sz="1100" dirty="0">
-                  <a:latin typeface="+mj-lt"/>
-                </a:rPr>
-                <a:t>Chill Portions</a:t>
-              </a:r>
-            </a:p>
-          </p:txBody>
-        </p:sp>
-      </p:grpSp>
-      <p:sp>
-        <p:nvSpPr>
-          <p:cNvPr id="108" name="Rectangle 107">
-            <a:extLst>
-              <a:ext uri="{FF2B5EF4-FFF2-40B4-BE49-F238E27FC236}">
-                <a16:creationId xmlns:a16="http://schemas.microsoft.com/office/drawing/2014/main" id="{1BE74DE6-58EE-0044-AEBF-D0B9B1800574}"/>
-              </a:ext>
-            </a:extLst>
-          </p:cNvPr>
-          <p:cNvSpPr>
-            <a:spLocks noChangeAspect="1"/>
-          </p:cNvSpPr>
-          <p:nvPr/>
-        </p:nvSpPr>
-        <p:spPr>
-          <a:xfrm>
-            <a:off x="9154645" y="1042796"/>
-            <a:ext cx="2852013" cy="4612365"/>
+            <a:off x="9449752" y="870505"/>
+            <a:ext cx="2487453" cy="804148"/>
           </a:xfrm>
           <a:prstGeom prst="rect">
             <a:avLst/>
           </a:prstGeom>
           <a:noFill/>
           <a:ln w="19050">
-            <a:solidFill>
-              <a:schemeClr val="tx1"/>
-            </a:solidFill>
+            <a:noFill/>
           </a:ln>
         </p:spPr>
         <p:style>
@@ -5002,16 +5304,23 @@
           <a:lstStyle/>
           <a:p>
             <a:pPr algn="ctr"/>
-            <a:endParaRPr lang="en-DE"/>
-          </a:p>
-        </p:txBody>
-      </p:sp>
-      <p:sp>
-        <p:nvSpPr>
-          <p:cNvPr id="110" name="Rechteck 76">
-            <a:extLst>
-              <a:ext uri="{FF2B5EF4-FFF2-40B4-BE49-F238E27FC236}">
-                <a16:creationId xmlns:a16="http://schemas.microsoft.com/office/drawing/2014/main" id="{E4C4C69F-CC1E-CC4F-8EA2-0B855D5A35D3}"/>
+            <a:r>
+              <a:rPr lang="en-GB" sz="1900" dirty="0">
+                <a:solidFill>
+                  <a:schemeClr val="tx1"/>
+                </a:solidFill>
+              </a:rPr>
+              <a:t>Safe Winter Chill map</a:t>
+            </a:r>
+          </a:p>
+        </p:txBody>
+      </p:sp>
+      <p:sp>
+        <p:nvSpPr>
+          <p:cNvPr id="105" name="Rechteck 104">
+            <a:extLst>
+              <a:ext uri="{FF2B5EF4-FFF2-40B4-BE49-F238E27FC236}">
+                <a16:creationId xmlns:a16="http://schemas.microsoft.com/office/drawing/2014/main" id="{4670E472-6AC7-4A35-8513-D294F73C48EE}"/>
               </a:ext>
             </a:extLst>
           </p:cNvPr>
@@ -5020,14 +5329,16 @@
         </p:nvSpPr>
         <p:spPr>
           <a:xfrm>
-            <a:off x="9449752" y="870505"/>
-            <a:ext cx="2487453" cy="804148"/>
+            <a:off x="5463386" y="157461"/>
+            <a:ext cx="3520566" cy="6383033"/>
           </a:xfrm>
           <a:prstGeom prst="rect">
             <a:avLst/>
           </a:prstGeom>
-          <a:noFill/>
-          <a:ln w="19050">
+          <a:solidFill>
+            <a:srgbClr val="E7E6E6"/>
+          </a:solidFill>
+          <a:ln>
             <a:noFill/>
           </a:ln>
         </p:spPr>
@@ -5052,23 +5363,16 @@
           <a:lstStyle/>
           <a:p>
             <a:pPr algn="ctr"/>
-            <a:r>
-              <a:rPr lang="en-GB" sz="1900" dirty="0">
-                <a:solidFill>
-                  <a:schemeClr val="tx1"/>
-                </a:solidFill>
-              </a:rPr>
-              <a:t>Safe Winter Chill map</a:t>
-            </a:r>
-          </a:p>
-        </p:txBody>
-      </p:sp>
-      <p:sp>
-        <p:nvSpPr>
-          <p:cNvPr id="105" name="Rechteck 104">
-            <a:extLst>
-              <a:ext uri="{FF2B5EF4-FFF2-40B4-BE49-F238E27FC236}">
-                <a16:creationId xmlns:a16="http://schemas.microsoft.com/office/drawing/2014/main" id="{4670E472-6AC7-4A35-8513-D294F73C48EE}"/>
+            <a:endParaRPr lang="de-DE"/>
+          </a:p>
+        </p:txBody>
+      </p:sp>
+      <p:sp>
+        <p:nvSpPr>
+          <p:cNvPr id="104" name="Rechteck 103">
+            <a:extLst>
+              <a:ext uri="{FF2B5EF4-FFF2-40B4-BE49-F238E27FC236}">
+                <a16:creationId xmlns:a16="http://schemas.microsoft.com/office/drawing/2014/main" id="{26006F44-D22B-4880-B8C2-69F18BB87D46}"/>
               </a:ext>
             </a:extLst>
           </p:cNvPr>
@@ -5077,14 +5381,14 @@
         </p:nvSpPr>
         <p:spPr>
           <a:xfrm>
-            <a:off x="5463386" y="157461"/>
-            <a:ext cx="3520566" cy="6383033"/>
+            <a:off x="2871688" y="138896"/>
+            <a:ext cx="3134154" cy="6426977"/>
           </a:xfrm>
           <a:prstGeom prst="rect">
             <a:avLst/>
           </a:prstGeom>
           <a:solidFill>
-            <a:srgbClr val="E7E6E6"/>
+            <a:schemeClr val="bg1"/>
           </a:solidFill>
           <a:ln>
             <a:noFill/>
@@ -5117,10 +5421,10 @@
       </p:sp>
       <p:sp>
         <p:nvSpPr>
-          <p:cNvPr id="104" name="Rechteck 103">
-            <a:extLst>
-              <a:ext uri="{FF2B5EF4-FFF2-40B4-BE49-F238E27FC236}">
-                <a16:creationId xmlns:a16="http://schemas.microsoft.com/office/drawing/2014/main" id="{26006F44-D22B-4880-B8C2-69F18BB87D46}"/>
+          <p:cNvPr id="100" name="Rechteck 99">
+            <a:extLst>
+              <a:ext uri="{FF2B5EF4-FFF2-40B4-BE49-F238E27FC236}">
+                <a16:creationId xmlns:a16="http://schemas.microsoft.com/office/drawing/2014/main" id="{F372E01C-797C-4FEC-929B-82E0ABBFA063}"/>
               </a:ext>
             </a:extLst>
           </p:cNvPr>
@@ -5129,14 +5433,14 @@
         </p:nvSpPr>
         <p:spPr>
           <a:xfrm>
-            <a:off x="2871688" y="138896"/>
-            <a:ext cx="3134154" cy="6426977"/>
+            <a:off x="110589" y="138898"/>
+            <a:ext cx="2665884" cy="6427002"/>
           </a:xfrm>
           <a:prstGeom prst="rect">
             <a:avLst/>
           </a:prstGeom>
           <a:solidFill>
-            <a:schemeClr val="bg1"/>
+            <a:schemeClr val="bg2"/>
           </a:solidFill>
           <a:ln>
             <a:noFill/>
@@ -5169,10 +5473,10 @@
       </p:sp>
       <p:sp>
         <p:nvSpPr>
-          <p:cNvPr id="100" name="Rechteck 99">
-            <a:extLst>
-              <a:ext uri="{FF2B5EF4-FFF2-40B4-BE49-F238E27FC236}">
-                <a16:creationId xmlns:a16="http://schemas.microsoft.com/office/drawing/2014/main" id="{F372E01C-797C-4FEC-929B-82E0ABBFA063}"/>
+          <p:cNvPr id="50" name="Rechteck 49">
+            <a:extLst>
+              <a:ext uri="{FF2B5EF4-FFF2-40B4-BE49-F238E27FC236}">
+                <a16:creationId xmlns:a16="http://schemas.microsoft.com/office/drawing/2014/main" id="{5FE91B47-B482-4DD9-B1E5-72F91AA49998}"/>
               </a:ext>
             </a:extLst>
           </p:cNvPr>
@@ -5181,17 +5485,19 @@
         </p:nvSpPr>
         <p:spPr>
           <a:xfrm>
-            <a:off x="110589" y="138898"/>
-            <a:ext cx="2665884" cy="6427002"/>
+            <a:off x="435033" y="1044322"/>
+            <a:ext cx="2267263" cy="804148"/>
           </a:xfrm>
           <a:prstGeom prst="rect">
             <a:avLst/>
           </a:prstGeom>
           <a:solidFill>
-            <a:schemeClr val="bg2"/>
+            <a:schemeClr val="bg1"/>
           </a:solidFill>
-          <a:ln>
-            <a:noFill/>
+          <a:ln w="19050">
+            <a:solidFill>
+              <a:schemeClr val="tx1"/>
+            </a:solidFill>
           </a:ln>
         </p:spPr>
         <p:style>
@@ -5215,16 +5521,23 @@
           <a:lstStyle/>
           <a:p>
             <a:pPr algn="ctr"/>
-            <a:endParaRPr lang="de-DE"/>
-          </a:p>
-        </p:txBody>
-      </p:sp>
-      <p:sp>
-        <p:nvSpPr>
-          <p:cNvPr id="50" name="Rechteck 49">
-            <a:extLst>
-              <a:ext uri="{FF2B5EF4-FFF2-40B4-BE49-F238E27FC236}">
-                <a16:creationId xmlns:a16="http://schemas.microsoft.com/office/drawing/2014/main" id="{5FE91B47-B482-4DD9-B1E5-72F91AA49998}"/>
+            <a:r>
+              <a:rPr lang="en-GB" sz="1900" dirty="0">
+                <a:solidFill>
+                  <a:schemeClr val="tx1"/>
+                </a:solidFill>
+              </a:rPr>
+              <a:t>Safe Winter Chill (weather station)</a:t>
+            </a:r>
+          </a:p>
+        </p:txBody>
+      </p:sp>
+      <p:sp>
+        <p:nvSpPr>
+          <p:cNvPr id="51" name="Rechteck 50">
+            <a:extLst>
+              <a:ext uri="{FF2B5EF4-FFF2-40B4-BE49-F238E27FC236}">
+                <a16:creationId xmlns:a16="http://schemas.microsoft.com/office/drawing/2014/main" id="{5F3DAC83-C5EC-4BB6-9185-1BEA909BC6F7}"/>
               </a:ext>
             </a:extLst>
           </p:cNvPr>
@@ -5233,8 +5546,8 @@
         </p:nvSpPr>
         <p:spPr>
           <a:xfrm>
-            <a:off x="435033" y="1044322"/>
-            <a:ext cx="2267263" cy="804148"/>
+            <a:off x="6096000" y="5699673"/>
+            <a:ext cx="2748017" cy="804148"/>
           </a:xfrm>
           <a:prstGeom prst="rect">
             <a:avLst/>
@@ -5275,68 +5588,7 @@
                   <a:schemeClr val="tx1"/>
                 </a:solidFill>
               </a:rPr>
-              <a:t>Safe Winter Chill (weather station)</a:t>
-            </a:r>
-          </a:p>
-        </p:txBody>
-      </p:sp>
-      <p:sp>
-        <p:nvSpPr>
-          <p:cNvPr id="51" name="Rechteck 50">
-            <a:extLst>
-              <a:ext uri="{FF2B5EF4-FFF2-40B4-BE49-F238E27FC236}">
-                <a16:creationId xmlns:a16="http://schemas.microsoft.com/office/drawing/2014/main" id="{5F3DAC83-C5EC-4BB6-9185-1BEA909BC6F7}"/>
-              </a:ext>
-            </a:extLst>
-          </p:cNvPr>
-          <p:cNvSpPr/>
-          <p:nvPr/>
-        </p:nvSpPr>
-        <p:spPr>
-          <a:xfrm>
-            <a:off x="6130765" y="5699673"/>
-            <a:ext cx="2659807" cy="804148"/>
-          </a:xfrm>
-          <a:prstGeom prst="rect">
-            <a:avLst/>
-          </a:prstGeom>
-          <a:solidFill>
-            <a:schemeClr val="bg1"/>
-          </a:solidFill>
-          <a:ln w="19050">
-            <a:solidFill>
-              <a:schemeClr val="tx1"/>
-            </a:solidFill>
-          </a:ln>
-        </p:spPr>
-        <p:style>
-          <a:lnRef idx="2">
-            <a:schemeClr val="accent1">
-              <a:shade val="50000"/>
-            </a:schemeClr>
-          </a:lnRef>
-          <a:fillRef idx="1">
-            <a:schemeClr val="accent1"/>
-          </a:fillRef>
-          <a:effectRef idx="0">
-            <a:schemeClr val="accent1"/>
-          </a:effectRef>
-          <a:fontRef idx="minor">
-            <a:schemeClr val="lt1"/>
-          </a:fontRef>
-        </p:style>
-        <p:txBody>
-          <a:bodyPr rtlCol="0" anchor="ctr"/>
-          <a:lstStyle/>
-          <a:p>
-            <a:pPr algn="ctr"/>
-            <a:r>
-              <a:rPr lang="en-GB" sz="1900" dirty="0">
-                <a:solidFill>
-                  <a:schemeClr val="tx1"/>
-                </a:solidFill>
-              </a:rPr>
-              <a:t>Correction variable map (WorldClim)</a:t>
+              <a:t>Correction variable maps (WorldClim)</a:t>
             </a:r>
           </a:p>
         </p:txBody>
@@ -5960,12 +6212,12 @@
         </p:nvCxnSpPr>
         <p:spPr>
           <a:xfrm flipV="1">
-            <a:off x="8844018" y="3348979"/>
-            <a:ext cx="310627" cy="1136552"/>
+            <a:off x="8844018" y="3292733"/>
+            <a:ext cx="310627" cy="1192798"/>
           </a:xfrm>
           <a:prstGeom prst="bentConnector3">
             <a:avLst>
-              <a:gd name="adj1" fmla="val 40401"/>
+              <a:gd name="adj1" fmla="val 41823"/>
             </a:avLst>
           </a:prstGeom>
           <a:ln w="19050">
@@ -6354,8 +6606,8 @@
         </p:nvCxnSpPr>
         <p:spPr>
           <a:xfrm rot="10800000">
-            <a:off x="4365529" y="5756119"/>
-            <a:ext cx="1765236" cy="345629"/>
+            <a:off x="4365530" y="5756119"/>
+            <a:ext cx="1730471" cy="345629"/>
           </a:xfrm>
           <a:prstGeom prst="bentConnector2">
             <a:avLst/>
@@ -6451,7 +6703,7 @@
         <p:spPr>
           <a:xfrm>
             <a:off x="8788402" y="1443865"/>
-            <a:ext cx="366243" cy="1905114"/>
+            <a:ext cx="366243" cy="1848868"/>
           </a:xfrm>
           <a:prstGeom prst="bentConnector3">
             <a:avLst>
@@ -6499,14 +6751,13 @@
               </a:ext>
             </a:extLst>
           </a:blip>
-          <a:stretch>
-            <a:fillRect/>
-          </a:stretch>
+          <a:srcRect/>
+          <a:stretch/>
         </p:blipFill>
         <p:spPr>
           <a:xfrm>
             <a:off x="2832433" y="3499187"/>
-            <a:ext cx="3069904" cy="2251089"/>
+            <a:ext cx="3069903" cy="2251089"/>
           </a:xfrm>
           <a:prstGeom prst="rect">
             <a:avLst/>
@@ -6567,6 +6818,182 @@
               </a:rPr>
               <a:t>3D correction model</a:t>
             </a:r>
+          </a:p>
+        </p:txBody>
+      </p:sp>
+      <p:pic>
+        <p:nvPicPr>
+          <p:cNvPr id="39" name="Picture 38">
+            <a:extLst>
+              <a:ext uri="{FF2B5EF4-FFF2-40B4-BE49-F238E27FC236}">
+                <a16:creationId xmlns:a16="http://schemas.microsoft.com/office/drawing/2014/main" id="{0F4F82C3-E7F8-8849-8DD4-9D2ACD4D6154}"/>
+              </a:ext>
+            </a:extLst>
+          </p:cNvPr>
+          <p:cNvPicPr>
+            <a:picLocks noChangeAspect="1"/>
+          </p:cNvPicPr>
+          <p:nvPr/>
+        </p:nvPicPr>
+        <p:blipFill rotWithShape="1">
+          <a:blip r:embed="rId4">
+            <a:extLst>
+              <a:ext uri="{28A0092B-C50C-407E-A947-70E740481C1C}">
+                <a14:useLocalDpi xmlns:a14="http://schemas.microsoft.com/office/drawing/2010/main" val="0"/>
+              </a:ext>
+            </a:extLst>
+          </a:blip>
+          <a:srcRect l="15103" r="11332"/>
+          <a:stretch/>
+        </p:blipFill>
+        <p:spPr>
+          <a:xfrm>
+            <a:off x="9198972" y="1487243"/>
+            <a:ext cx="2769536" cy="4055425"/>
+          </a:xfrm>
+          <a:prstGeom prst="rect">
+            <a:avLst/>
+          </a:prstGeom>
+        </p:spPr>
+      </p:pic>
+      <p:sp>
+        <p:nvSpPr>
+          <p:cNvPr id="2" name="Rectangle 1">
+            <a:extLst>
+              <a:ext uri="{FF2B5EF4-FFF2-40B4-BE49-F238E27FC236}">
+                <a16:creationId xmlns:a16="http://schemas.microsoft.com/office/drawing/2014/main" id="{9D38B069-FEED-1943-BEAC-784629FF2E59}"/>
+              </a:ext>
+            </a:extLst>
+          </p:cNvPr>
+          <p:cNvSpPr/>
+          <p:nvPr/>
+        </p:nvSpPr>
+        <p:spPr>
+          <a:xfrm>
+            <a:off x="10804525" y="4556125"/>
+            <a:ext cx="546100" cy="711200"/>
+          </a:xfrm>
+          <a:prstGeom prst="rect">
+            <a:avLst/>
+          </a:prstGeom>
+          <a:solidFill>
+            <a:schemeClr val="bg1"/>
+          </a:solidFill>
+          <a:ln>
+            <a:noFill/>
+          </a:ln>
+        </p:spPr>
+        <p:style>
+          <a:lnRef idx="2">
+            <a:schemeClr val="accent1">
+              <a:shade val="50000"/>
+            </a:schemeClr>
+          </a:lnRef>
+          <a:fillRef idx="1">
+            <a:schemeClr val="accent1"/>
+          </a:fillRef>
+          <a:effectRef idx="0">
+            <a:schemeClr val="accent1"/>
+          </a:effectRef>
+          <a:fontRef idx="minor">
+            <a:schemeClr val="lt1"/>
+          </a:fontRef>
+        </p:style>
+        <p:txBody>
+          <a:bodyPr rtlCol="0" anchor="ctr"/>
+          <a:lstStyle/>
+          <a:p>
+            <a:pPr algn="ctr"/>
+            <a:endParaRPr lang="en-DE"/>
+          </a:p>
+        </p:txBody>
+      </p:sp>
+      <p:pic>
+        <p:nvPicPr>
+          <p:cNvPr id="40" name="Picture 39">
+            <a:extLst>
+              <a:ext uri="{FF2B5EF4-FFF2-40B4-BE49-F238E27FC236}">
+                <a16:creationId xmlns:a16="http://schemas.microsoft.com/office/drawing/2014/main" id="{708FE4BA-7B54-8A41-B302-795237B9BF3C}"/>
+              </a:ext>
+            </a:extLst>
+          </p:cNvPr>
+          <p:cNvPicPr>
+            <a:picLocks noChangeAspect="1"/>
+          </p:cNvPicPr>
+          <p:nvPr/>
+        </p:nvPicPr>
+        <p:blipFill rotWithShape="1">
+          <a:blip r:embed="rId4">
+            <a:extLst>
+              <a:ext uri="{28A0092B-C50C-407E-A947-70E740481C1C}">
+                <a14:useLocalDpi xmlns:a14="http://schemas.microsoft.com/office/drawing/2010/main" val="0"/>
+              </a:ext>
+            </a:extLst>
+          </a:blip>
+          <a:srcRect l="57895" t="75457" r="29233" b="6662"/>
+          <a:stretch/>
+        </p:blipFill>
+        <p:spPr>
+          <a:xfrm>
+            <a:off x="11070521" y="4516381"/>
+            <a:ext cx="484591" cy="725167"/>
+          </a:xfrm>
+          <a:prstGeom prst="rect">
+            <a:avLst/>
+          </a:prstGeom>
+        </p:spPr>
+      </p:pic>
+      <p:sp>
+        <p:nvSpPr>
+          <p:cNvPr id="108" name="Rectangle 107">
+            <a:extLst>
+              <a:ext uri="{FF2B5EF4-FFF2-40B4-BE49-F238E27FC236}">
+                <a16:creationId xmlns:a16="http://schemas.microsoft.com/office/drawing/2014/main" id="{1BE74DE6-58EE-0044-AEBF-D0B9B1800574}"/>
+              </a:ext>
+            </a:extLst>
+          </p:cNvPr>
+          <p:cNvSpPr>
+            <a:spLocks noChangeAspect="1"/>
+          </p:cNvSpPr>
+          <p:nvPr/>
+        </p:nvSpPr>
+        <p:spPr>
+          <a:xfrm>
+            <a:off x="9154645" y="1042797"/>
+            <a:ext cx="2852013" cy="4499872"/>
+          </a:xfrm>
+          <a:prstGeom prst="rect">
+            <a:avLst/>
+          </a:prstGeom>
+          <a:noFill/>
+          <a:ln w="19050">
+            <a:solidFill>
+              <a:schemeClr val="tx1"/>
+            </a:solidFill>
+          </a:ln>
+        </p:spPr>
+        <p:style>
+          <a:lnRef idx="2">
+            <a:schemeClr val="accent1">
+              <a:shade val="50000"/>
+            </a:schemeClr>
+          </a:lnRef>
+          <a:fillRef idx="1">
+            <a:schemeClr val="accent1"/>
+          </a:fillRef>
+          <a:effectRef idx="0">
+            <a:schemeClr val="accent1"/>
+          </a:effectRef>
+          <a:fontRef idx="minor">
+            <a:schemeClr val="lt1"/>
+          </a:fontRef>
+        </p:style>
+        <p:txBody>
+          <a:bodyPr rtlCol="0" anchor="ctr"/>
+          <a:lstStyle/>
+          <a:p>
+            <a:pPr algn="ctr"/>
+            <a:endParaRPr lang="en-DE"/>
           </a:p>
         </p:txBody>
       </p:sp>
@@ -9399,4 +9826,299 @@
     </a:ext>
   </a:extLst>
 </a:theme>
+</file>
+
+<file path=ppt/theme/theme2.xml><?xml version="1.0" encoding="utf-8"?>
+<a:theme xmlns:a="http://schemas.openxmlformats.org/drawingml/2006/main" name="Office Theme">
+  <a:themeElements>
+    <a:clrScheme name="Office">
+      <a:dk1>
+        <a:sysClr val="windowText" lastClr="000000"/>
+      </a:dk1>
+      <a:lt1>
+        <a:sysClr val="window" lastClr="FFFFFF"/>
+      </a:lt1>
+      <a:dk2>
+        <a:srgbClr val="44546A"/>
+      </a:dk2>
+      <a:lt2>
+        <a:srgbClr val="E7E6E6"/>
+      </a:lt2>
+      <a:accent1>
+        <a:srgbClr val="4472C4"/>
+      </a:accent1>
+      <a:accent2>
+        <a:srgbClr val="ED7D31"/>
+      </a:accent2>
+      <a:accent3>
+        <a:srgbClr val="A5A5A5"/>
+      </a:accent3>
+      <a:accent4>
+        <a:srgbClr val="FFC000"/>
+      </a:accent4>
+      <a:accent5>
+        <a:srgbClr val="5B9BD5"/>
+      </a:accent5>
+      <a:accent6>
+        <a:srgbClr val="70AD47"/>
+      </a:accent6>
+      <a:hlink>
+        <a:srgbClr val="0563C1"/>
+      </a:hlink>
+      <a:folHlink>
+        <a:srgbClr val="954F72"/>
+      </a:folHlink>
+    </a:clrScheme>
+    <a:fontScheme name="Office">
+      <a:majorFont>
+        <a:latin typeface="Calibri Light" panose="020F0302020204030204"/>
+        <a:ea typeface=""/>
+        <a:cs typeface=""/>
+        <a:font script="Jpan" typeface="游ゴシック Light"/>
+        <a:font script="Hang" typeface="맑은 고딕"/>
+        <a:font script="Hans" typeface="等线 Light"/>
+        <a:font script="Hant" typeface="新細明體"/>
+        <a:font script="Arab" typeface="Times New Roman"/>
+        <a:font script="Hebr" typeface="Times New Roman"/>
+        <a:font script="Thai" typeface="Angsana New"/>
+        <a:font script="Ethi" typeface="Nyala"/>
+        <a:font script="Beng" typeface="Vrinda"/>
+        <a:font script="Gujr" typeface="Shruti"/>
+        <a:font script="Khmr" typeface="MoolBoran"/>
+        <a:font script="Knda" typeface="Tunga"/>
+        <a:font script="Guru" typeface="Raavi"/>
+        <a:font script="Cans" typeface="Euphemia"/>
+        <a:font script="Cher" typeface="Plantagenet Cherokee"/>
+        <a:font script="Yiii" typeface="Microsoft Yi Baiti"/>
+        <a:font script="Tibt" typeface="Microsoft Himalaya"/>
+        <a:font script="Thaa" typeface="MV Boli"/>
+        <a:font script="Deva" typeface="Mangal"/>
+        <a:font script="Telu" typeface="Gautami"/>
+        <a:font script="Taml" typeface="Latha"/>
+        <a:font script="Syrc" typeface="Estrangelo Edessa"/>
+        <a:font script="Orya" typeface="Kalinga"/>
+        <a:font script="Mlym" typeface="Kartika"/>
+        <a:font script="Laoo" typeface="DokChampa"/>
+        <a:font script="Sinh" typeface="Iskoola Pota"/>
+        <a:font script="Mong" typeface="Mongolian Baiti"/>
+        <a:font script="Viet" typeface="Times New Roman"/>
+        <a:font script="Uigh" typeface="Microsoft Uighur"/>
+        <a:font script="Geor" typeface="Sylfaen"/>
+        <a:font script="Armn" typeface="Arial"/>
+        <a:font script="Bugi" typeface="Leelawadee UI"/>
+        <a:font script="Bopo" typeface="Microsoft JhengHei"/>
+        <a:font script="Java" typeface="Javanese Text"/>
+        <a:font script="Lisu" typeface="Segoe UI"/>
+        <a:font script="Mymr" typeface="Myanmar Text"/>
+        <a:font script="Nkoo" typeface="Ebrima"/>
+        <a:font script="Olck" typeface="Nirmala UI"/>
+        <a:font script="Osma" typeface="Ebrima"/>
+        <a:font script="Phag" typeface="Phagspa"/>
+        <a:font script="Syrn" typeface="Estrangelo Edessa"/>
+        <a:font script="Syrj" typeface="Estrangelo Edessa"/>
+        <a:font script="Syre" typeface="Estrangelo Edessa"/>
+        <a:font script="Sora" typeface="Nirmala UI"/>
+        <a:font script="Tale" typeface="Microsoft Tai Le"/>
+        <a:font script="Talu" typeface="Microsoft New Tai Lue"/>
+        <a:font script="Tfng" typeface="Ebrima"/>
+      </a:majorFont>
+      <a:minorFont>
+        <a:latin typeface="Calibri" panose="020F0502020204030204"/>
+        <a:ea typeface=""/>
+        <a:cs typeface=""/>
+        <a:font script="Jpan" typeface="游ゴシック"/>
+        <a:font script="Hang" typeface="맑은 고딕"/>
+        <a:font script="Hans" typeface="等线"/>
+        <a:font script="Hant" typeface="新細明體"/>
+        <a:font script="Arab" typeface="Arial"/>
+        <a:font script="Hebr" typeface="Arial"/>
+        <a:font script="Thai" typeface="Cordia New"/>
+        <a:font script="Ethi" typeface="Nyala"/>
+        <a:font script="Beng" typeface="Vrinda"/>
+        <a:font script="Gujr" typeface="Shruti"/>
+        <a:font script="Khmr" typeface="DaunPenh"/>
+        <a:font script="Knda" typeface="Tunga"/>
+        <a:font script="Guru" typeface="Raavi"/>
+        <a:font script="Cans" typeface="Euphemia"/>
+        <a:font script="Cher" typeface="Plantagenet Cherokee"/>
+        <a:font script="Yiii" typeface="Microsoft Yi Baiti"/>
+        <a:font script="Tibt" typeface="Microsoft Himalaya"/>
+        <a:font script="Thaa" typeface="MV Boli"/>
+        <a:font script="Deva" typeface="Mangal"/>
+        <a:font script="Telu" typeface="Gautami"/>
+        <a:font script="Taml" typeface="Latha"/>
+        <a:font script="Syrc" typeface="Estrangelo Edessa"/>
+        <a:font script="Orya" typeface="Kalinga"/>
+        <a:font script="Mlym" typeface="Kartika"/>
+        <a:font script="Laoo" typeface="DokChampa"/>
+        <a:font script="Sinh" typeface="Iskoola Pota"/>
+        <a:font script="Mong" typeface="Mongolian Baiti"/>
+        <a:font script="Viet" typeface="Arial"/>
+        <a:font script="Uigh" typeface="Microsoft Uighur"/>
+        <a:font script="Geor" typeface="Sylfaen"/>
+        <a:font script="Armn" typeface="Arial"/>
+        <a:font script="Bugi" typeface="Leelawadee UI"/>
+        <a:font script="Bopo" typeface="Microsoft JhengHei"/>
+        <a:font script="Java" typeface="Javanese Text"/>
+        <a:font script="Lisu" typeface="Segoe UI"/>
+        <a:font script="Mymr" typeface="Myanmar Text"/>
+        <a:font script="Nkoo" typeface="Ebrima"/>
+        <a:font script="Olck" typeface="Nirmala UI"/>
+        <a:font script="Osma" typeface="Ebrima"/>
+        <a:font script="Phag" typeface="Phagspa"/>
+        <a:font script="Syrn" typeface="Estrangelo Edessa"/>
+        <a:font script="Syrj" typeface="Estrangelo Edessa"/>
+        <a:font script="Syre" typeface="Estrangelo Edessa"/>
+        <a:font script="Sora" typeface="Nirmala UI"/>
+        <a:font script="Tale" typeface="Microsoft Tai Le"/>
+        <a:font script="Talu" typeface="Microsoft New Tai Lue"/>
+        <a:font script="Tfng" typeface="Ebrima"/>
+      </a:minorFont>
+    </a:fontScheme>
+    <a:fmtScheme name="Office">
+      <a:fillStyleLst>
+        <a:solidFill>
+          <a:schemeClr val="phClr"/>
+        </a:solidFill>
+        <a:gradFill rotWithShape="1">
+          <a:gsLst>
+            <a:gs pos="0">
+              <a:schemeClr val="phClr">
+                <a:lumMod val="110000"/>
+                <a:satMod val="105000"/>
+                <a:tint val="67000"/>
+              </a:schemeClr>
+            </a:gs>
+            <a:gs pos="50000">
+              <a:schemeClr val="phClr">
+                <a:lumMod val="105000"/>
+                <a:satMod val="103000"/>
+                <a:tint val="73000"/>
+              </a:schemeClr>
+            </a:gs>
+            <a:gs pos="100000">
+              <a:schemeClr val="phClr">
+                <a:lumMod val="105000"/>
+                <a:satMod val="109000"/>
+                <a:tint val="81000"/>
+              </a:schemeClr>
+            </a:gs>
+          </a:gsLst>
+          <a:lin ang="5400000" scaled="0"/>
+        </a:gradFill>
+        <a:gradFill rotWithShape="1">
+          <a:gsLst>
+            <a:gs pos="0">
+              <a:schemeClr val="phClr">
+                <a:satMod val="103000"/>
+                <a:lumMod val="102000"/>
+                <a:tint val="94000"/>
+              </a:schemeClr>
+            </a:gs>
+            <a:gs pos="50000">
+              <a:schemeClr val="phClr">
+                <a:satMod val="110000"/>
+                <a:lumMod val="100000"/>
+                <a:shade val="100000"/>
+              </a:schemeClr>
+            </a:gs>
+            <a:gs pos="100000">
+              <a:schemeClr val="phClr">
+                <a:lumMod val="99000"/>
+                <a:satMod val="120000"/>
+                <a:shade val="78000"/>
+              </a:schemeClr>
+            </a:gs>
+          </a:gsLst>
+          <a:lin ang="5400000" scaled="0"/>
+        </a:gradFill>
+      </a:fillStyleLst>
+      <a:lnStyleLst>
+        <a:ln w="6350" cap="flat" cmpd="sng" algn="ctr">
+          <a:solidFill>
+            <a:schemeClr val="phClr"/>
+          </a:solidFill>
+          <a:prstDash val="solid"/>
+          <a:miter lim="800000"/>
+        </a:ln>
+        <a:ln w="12700" cap="flat" cmpd="sng" algn="ctr">
+          <a:solidFill>
+            <a:schemeClr val="phClr"/>
+          </a:solidFill>
+          <a:prstDash val="solid"/>
+          <a:miter lim="800000"/>
+        </a:ln>
+        <a:ln w="19050" cap="flat" cmpd="sng" algn="ctr">
+          <a:solidFill>
+            <a:schemeClr val="phClr"/>
+          </a:solidFill>
+          <a:prstDash val="solid"/>
+          <a:miter lim="800000"/>
+        </a:ln>
+      </a:lnStyleLst>
+      <a:effectStyleLst>
+        <a:effectStyle>
+          <a:effectLst/>
+        </a:effectStyle>
+        <a:effectStyle>
+          <a:effectLst/>
+        </a:effectStyle>
+        <a:effectStyle>
+          <a:effectLst>
+            <a:outerShdw blurRad="57150" dist="19050" dir="5400000" algn="ctr" rotWithShape="0">
+              <a:srgbClr val="000000">
+                <a:alpha val="63000"/>
+              </a:srgbClr>
+            </a:outerShdw>
+          </a:effectLst>
+        </a:effectStyle>
+      </a:effectStyleLst>
+      <a:bgFillStyleLst>
+        <a:solidFill>
+          <a:schemeClr val="phClr"/>
+        </a:solidFill>
+        <a:solidFill>
+          <a:schemeClr val="phClr">
+            <a:tint val="95000"/>
+            <a:satMod val="170000"/>
+          </a:schemeClr>
+        </a:solidFill>
+        <a:gradFill rotWithShape="1">
+          <a:gsLst>
+            <a:gs pos="0">
+              <a:schemeClr val="phClr">
+                <a:tint val="93000"/>
+                <a:satMod val="150000"/>
+                <a:shade val="98000"/>
+                <a:lumMod val="102000"/>
+              </a:schemeClr>
+            </a:gs>
+            <a:gs pos="50000">
+              <a:schemeClr val="phClr">
+                <a:tint val="98000"/>
+                <a:satMod val="130000"/>
+                <a:shade val="90000"/>
+                <a:lumMod val="103000"/>
+              </a:schemeClr>
+            </a:gs>
+            <a:gs pos="100000">
+              <a:schemeClr val="phClr">
+                <a:shade val="63000"/>
+                <a:satMod val="120000"/>
+              </a:schemeClr>
+            </a:gs>
+          </a:gsLst>
+          <a:lin ang="5400000" scaled="0"/>
+        </a:gradFill>
+      </a:bgFillStyleLst>
+    </a:fmtScheme>
+  </a:themeElements>
+  <a:objectDefaults/>
+  <a:extraClrSchemeLst/>
+  <a:extLst>
+    <a:ext uri="{05A4C25C-085E-4340-85A3-A5531E510DB2}">
+      <thm15:themeFamily xmlns:thm15="http://schemas.microsoft.com/office/thememl/2012/main" name="Office Theme" id="{62F939B6-93AF-4DB8-9C6B-D6C7DFDC589F}" vid="{4A3C46E8-61CC-4603-A589-7422A47A8E4A}"/>
+    </a:ext>
+  </a:extLst>
+</a:theme>
 </file>
</xml_diff>